<commit_message>
Update status report presentation
</commit_message>
<xml_diff>
--- a/02-status-reports/20190627/20190627_status_report.pptx
+++ b/02-status-reports/20190627/20190627_status_report.pptx
@@ -938,14 +938,18 @@
     </dgm:pt>
     <dgm:pt modelId="{02F863F0-3414-4785-A0EC-A8E93C0E0416}">
       <dgm:prSet phldrT="[Text]"/>
-      <dgm:spPr/>
+      <dgm:spPr>
+        <a:solidFill>
+          <a:srgbClr val="1C8F0D"/>
+        </a:solidFill>
+      </dgm:spPr>
       <dgm:t>
         <a:bodyPr/>
         <a:lstStyle/>
         <a:p>
           <a:r>
             <a:rPr lang="de-DE" dirty="0" smtClean="0"/>
-            <a:t>134</a:t>
+            <a:t>34</a:t>
           </a:r>
           <a:endParaRPr lang="de-DE" dirty="0"/>
         </a:p>
@@ -975,14 +979,18 @@
     </dgm:pt>
     <dgm:pt modelId="{B0F9F91B-2528-41C4-8058-D992150A2D11}">
       <dgm:prSet phldrT="[Text]"/>
-      <dgm:spPr/>
+      <dgm:spPr>
+        <a:solidFill>
+          <a:srgbClr val="1C8F0D"/>
+        </a:solidFill>
+      </dgm:spPr>
       <dgm:t>
         <a:bodyPr/>
         <a:lstStyle/>
         <a:p>
           <a:r>
             <a:rPr lang="de-DE" dirty="0" smtClean="0"/>
-            <a:t>135</a:t>
+            <a:t>35</a:t>
           </a:r>
           <a:endParaRPr lang="de-DE" dirty="0"/>
         </a:p>
@@ -1012,14 +1020,18 @@
     </dgm:pt>
     <dgm:pt modelId="{57CA1591-04DE-4A1D-B4AD-FBA77ED7E8E3}">
       <dgm:prSet phldrT="[Text]"/>
-      <dgm:spPr/>
+      <dgm:spPr>
+        <a:solidFill>
+          <a:srgbClr val="1C8F0D"/>
+        </a:solidFill>
+      </dgm:spPr>
       <dgm:t>
         <a:bodyPr/>
         <a:lstStyle/>
         <a:p>
           <a:r>
             <a:rPr lang="de-DE" dirty="0" smtClean="0"/>
-            <a:t>137</a:t>
+            <a:t>38</a:t>
           </a:r>
           <a:endParaRPr lang="de-DE" dirty="0"/>
         </a:p>
@@ -1049,14 +1061,18 @@
     </dgm:pt>
     <dgm:pt modelId="{8764EDA0-CF4E-4ABD-B123-EC75D980E992}">
       <dgm:prSet phldrT="[Text]"/>
-      <dgm:spPr/>
+      <dgm:spPr>
+        <a:solidFill>
+          <a:srgbClr val="1C8F0D"/>
+        </a:solidFill>
+      </dgm:spPr>
       <dgm:t>
         <a:bodyPr/>
         <a:lstStyle/>
         <a:p>
           <a:r>
             <a:rPr lang="de-DE" dirty="0" smtClean="0"/>
-            <a:t>139</a:t>
+            <a:t>40</a:t>
           </a:r>
           <a:endParaRPr lang="de-DE" dirty="0"/>
         </a:p>
@@ -1319,6 +1335,13 @@
         </dgm:presLayoutVars>
       </dgm:prSet>
       <dgm:spPr/>
+      <dgm:t>
+        <a:bodyPr/>
+        <a:lstStyle/>
+        <a:p>
+          <a:endParaRPr lang="de-DE"/>
+        </a:p>
+      </dgm:t>
     </dgm:pt>
     <dgm:pt modelId="{F57C7456-14AE-49E9-A4FA-9CB5CC905BA0}" type="pres">
       <dgm:prSet presAssocID="{BDC1DEFC-337D-4B36-BEAA-F9DE10D6E42A}" presName="sibTrans" presStyleCnt="0"/>
@@ -1369,6 +1392,13 @@
         </dgm:presLayoutVars>
       </dgm:prSet>
       <dgm:spPr/>
+      <dgm:t>
+        <a:bodyPr/>
+        <a:lstStyle/>
+        <a:p>
+          <a:endParaRPr lang="de-DE"/>
+        </a:p>
+      </dgm:t>
     </dgm:pt>
     <dgm:pt modelId="{9B65E38E-0F06-4998-B784-9CB6E84B3FFA}" type="pres">
       <dgm:prSet presAssocID="{0053F94A-CD9E-4837-A099-675B66DE0FC4}" presName="sibTrans" presStyleCnt="0"/>
@@ -1381,6 +1411,13 @@
         </dgm:presLayoutVars>
       </dgm:prSet>
       <dgm:spPr/>
+      <dgm:t>
+        <a:bodyPr/>
+        <a:lstStyle/>
+        <a:p>
+          <a:endParaRPr lang="de-DE"/>
+        </a:p>
+      </dgm:t>
     </dgm:pt>
     <dgm:pt modelId="{1568869C-FA6A-494C-A8C4-DB809842F083}" type="pres">
       <dgm:prSet presAssocID="{F40B1C75-E705-4583-92EE-5034BE34C58B}" presName="sibTrans" presStyleCnt="0"/>
@@ -1412,6 +1449,13 @@
         </dgm:presLayoutVars>
       </dgm:prSet>
       <dgm:spPr/>
+      <dgm:t>
+        <a:bodyPr/>
+        <a:lstStyle/>
+        <a:p>
+          <a:endParaRPr lang="de-DE"/>
+        </a:p>
+      </dgm:t>
     </dgm:pt>
     <dgm:pt modelId="{D8C213DC-CD9E-45FF-A66A-AEB31EF6A682}" type="pres">
       <dgm:prSet presAssocID="{3C748674-8048-4639-8CBB-8B3BE7D0775C}" presName="sibTrans" presStyleCnt="0"/>
@@ -1443,27 +1487,34 @@
         </dgm:presLayoutVars>
       </dgm:prSet>
       <dgm:spPr/>
+      <dgm:t>
+        <a:bodyPr/>
+        <a:lstStyle/>
+        <a:p>
+          <a:endParaRPr lang="de-DE"/>
+        </a:p>
+      </dgm:t>
     </dgm:pt>
   </dgm:ptLst>
   <dgm:cxnLst>
+    <dgm:cxn modelId="{A4227E8A-BDCA-443F-A287-4F2B83238052}" type="presOf" srcId="{02F863F0-3414-4785-A0EC-A8E93C0E0416}" destId="{FC00C114-74EB-4566-859B-22DA063E04AB}" srcOrd="0" destOrd="0" presId="urn:microsoft.com/office/officeart/2005/8/layout/hProcess9"/>
+    <dgm:cxn modelId="{CFA4D2AF-2F65-410A-A240-912A6BA52707}" type="presOf" srcId="{F5368A23-1B7D-4279-B3AD-4CA9F0518408}" destId="{46B10996-CBC4-4ABD-A1AD-6DE48D552B90}" srcOrd="0" destOrd="0" presId="urn:microsoft.com/office/officeart/2005/8/layout/hProcess9"/>
+    <dgm:cxn modelId="{71E19963-128E-4801-BAFF-6B43CBA232C4}" type="presOf" srcId="{57CA1591-04DE-4A1D-B4AD-FBA77ED7E8E3}" destId="{65D6038A-7649-46D0-A50F-90198E9F8DB6}" srcOrd="0" destOrd="0" presId="urn:microsoft.com/office/officeart/2005/8/layout/hProcess9"/>
     <dgm:cxn modelId="{08841E75-BBB9-4EB7-A813-6DC1DDAB8E80}" srcId="{F5368A23-1B7D-4279-B3AD-4CA9F0518408}" destId="{02F863F0-3414-4785-A0EC-A8E93C0E0416}" srcOrd="1" destOrd="0" parTransId="{0AECFA47-940C-40AC-8823-1D9757F33548}" sibTransId="{0EB542D9-3CB3-4581-A92E-FA26E7F5A423}"/>
-    <dgm:cxn modelId="{A4227E8A-BDCA-443F-A287-4F2B83238052}" type="presOf" srcId="{02F863F0-3414-4785-A0EC-A8E93C0E0416}" destId="{FC00C114-74EB-4566-859B-22DA063E04AB}" srcOrd="0" destOrd="0" presId="urn:microsoft.com/office/officeart/2005/8/layout/hProcess9"/>
-    <dgm:cxn modelId="{AB4BF255-B17F-4917-9240-019B21C3C4DC}" srcId="{F5368A23-1B7D-4279-B3AD-4CA9F0518408}" destId="{FF9708DA-19FB-49CF-9958-31E5A5112DFD}" srcOrd="4" destOrd="0" parTransId="{384AA3CE-BF75-4FC6-BDE4-0C17092DDECD}" sibTransId="{F40B1C75-E705-4583-92EE-5034BE34C58B}"/>
+    <dgm:cxn modelId="{0FB26CBC-551E-4D7F-B8BD-5A50EF2AA4E2}" type="presOf" srcId="{B0F9F91B-2528-41C4-8058-D992150A2D11}" destId="{744C1016-C156-4ADC-A006-BD70B6314860}" srcOrd="0" destOrd="0" presId="urn:microsoft.com/office/officeart/2005/8/layout/hProcess9"/>
+    <dgm:cxn modelId="{E33A493C-9C59-457E-85BC-F0C8AF7ACCAC}" type="presOf" srcId="{1409A60F-C7F3-48FD-99B2-605FC7E3929D}" destId="{E8221166-9812-4A37-94A6-2AE242069AD1}" srcOrd="0" destOrd="0" presId="urn:microsoft.com/office/officeart/2005/8/layout/hProcess9"/>
+    <dgm:cxn modelId="{1E094B69-CB3E-46BB-881C-407D361CA81A}" type="presOf" srcId="{F1841621-207C-4974-A8B4-D41CB0376707}" destId="{46E1ACF0-61DC-45C3-B038-8F1FC5909CF6}" srcOrd="0" destOrd="0" presId="urn:microsoft.com/office/officeart/2005/8/layout/hProcess9"/>
+    <dgm:cxn modelId="{7263FC2A-E95F-4EFD-90A4-B64A01B467F4}" type="presOf" srcId="{8764EDA0-CF4E-4ABD-B123-EC75D980E992}" destId="{607B7AD5-B559-4CF8-88ED-B825B9060AFC}" srcOrd="0" destOrd="0" presId="urn:microsoft.com/office/officeart/2005/8/layout/hProcess9"/>
+    <dgm:cxn modelId="{AB714C31-8A84-41EF-AA6D-AC3982D1C99A}" srcId="{F5368A23-1B7D-4279-B3AD-4CA9F0518408}" destId="{B0F9F91B-2528-41C4-8058-D992150A2D11}" srcOrd="2" destOrd="0" parTransId="{53E8B1B8-B974-4A6E-A825-D5B41EDE199E}" sibTransId="{D6862119-FAD2-4E70-BB80-071B1994AA32}"/>
+    <dgm:cxn modelId="{4730C764-307E-4C9E-A233-00CDD9943615}" srcId="{F5368A23-1B7D-4279-B3AD-4CA9F0518408}" destId="{8764EDA0-CF4E-4ABD-B123-EC75D980E992}" srcOrd="7" destOrd="0" parTransId="{E77188D3-A942-4B8D-B796-FC04E6671E2B}" sibTransId="{2D598A34-AF51-4E11-8983-E6312B19EB07}"/>
     <dgm:cxn modelId="{5A981381-A987-46FD-AE0C-90762041BEB0}" srcId="{F5368A23-1B7D-4279-B3AD-4CA9F0518408}" destId="{1409A60F-C7F3-48FD-99B2-605FC7E3929D}" srcOrd="8" destOrd="0" parTransId="{CC3D9663-28DB-43F7-A899-3E837510CF4D}" sibTransId="{905A50BE-0CF4-4F5A-A6BB-BA9646D01BBB}"/>
     <dgm:cxn modelId="{94FBB9E5-4B82-4473-93FA-795D52D7E07E}" srcId="{F5368A23-1B7D-4279-B3AD-4CA9F0518408}" destId="{1D792BD0-576B-412C-AD22-07E4F9008D6E}" srcOrd="6" destOrd="0" parTransId="{8BC9162E-8B52-4D85-AD6A-C1CDC1FCDF30}" sibTransId="{3C748674-8048-4639-8CBB-8B3BE7D0775C}"/>
-    <dgm:cxn modelId="{CFA4D2AF-2F65-410A-A240-912A6BA52707}" type="presOf" srcId="{F5368A23-1B7D-4279-B3AD-4CA9F0518408}" destId="{46B10996-CBC4-4ABD-A1AD-6DE48D552B90}" srcOrd="0" destOrd="0" presId="urn:microsoft.com/office/officeart/2005/8/layout/hProcess9"/>
-    <dgm:cxn modelId="{7263FC2A-E95F-4EFD-90A4-B64A01B467F4}" type="presOf" srcId="{8764EDA0-CF4E-4ABD-B123-EC75D980E992}" destId="{607B7AD5-B559-4CF8-88ED-B825B9060AFC}" srcOrd="0" destOrd="0" presId="urn:microsoft.com/office/officeart/2005/8/layout/hProcess9"/>
-    <dgm:cxn modelId="{4730C764-307E-4C9E-A233-00CDD9943615}" srcId="{F5368A23-1B7D-4279-B3AD-4CA9F0518408}" destId="{8764EDA0-CF4E-4ABD-B123-EC75D980E992}" srcOrd="7" destOrd="0" parTransId="{E77188D3-A942-4B8D-B796-FC04E6671E2B}" sibTransId="{2D598A34-AF51-4E11-8983-E6312B19EB07}"/>
-    <dgm:cxn modelId="{0FB26CBC-551E-4D7F-B8BD-5A50EF2AA4E2}" type="presOf" srcId="{B0F9F91B-2528-41C4-8058-D992150A2D11}" destId="{744C1016-C156-4ADC-A006-BD70B6314860}" srcOrd="0" destOrd="0" presId="urn:microsoft.com/office/officeart/2005/8/layout/hProcess9"/>
-    <dgm:cxn modelId="{1E094B69-CB3E-46BB-881C-407D361CA81A}" type="presOf" srcId="{F1841621-207C-4974-A8B4-D41CB0376707}" destId="{46E1ACF0-61DC-45C3-B038-8F1FC5909CF6}" srcOrd="0" destOrd="0" presId="urn:microsoft.com/office/officeart/2005/8/layout/hProcess9"/>
-    <dgm:cxn modelId="{AB714C31-8A84-41EF-AA6D-AC3982D1C99A}" srcId="{F5368A23-1B7D-4279-B3AD-4CA9F0518408}" destId="{B0F9F91B-2528-41C4-8058-D992150A2D11}" srcOrd="2" destOrd="0" parTransId="{53E8B1B8-B974-4A6E-A825-D5B41EDE199E}" sibTransId="{D6862119-FAD2-4E70-BB80-071B1994AA32}"/>
+    <dgm:cxn modelId="{CF4DFE49-F3ED-4599-A39F-ECEF3FDCB6B5}" type="presOf" srcId="{1D792BD0-576B-412C-AD22-07E4F9008D6E}" destId="{3EBFF596-174E-4DFC-AD7F-47B4B2FE0C74}" srcOrd="0" destOrd="0" presId="urn:microsoft.com/office/officeart/2005/8/layout/hProcess9"/>
+    <dgm:cxn modelId="{FF8D9B31-A43C-4C67-A69D-5583AB35FD1F}" srcId="{F5368A23-1B7D-4279-B3AD-4CA9F0518408}" destId="{F1841621-207C-4974-A8B4-D41CB0376707}" srcOrd="0" destOrd="0" parTransId="{26C85D8C-7646-40A1-B131-8AAF8C295C04}" sibTransId="{BDC1DEFC-337D-4B36-BEAA-F9DE10D6E42A}"/>
+    <dgm:cxn modelId="{2BA0FAE6-28AE-4826-B8F9-0CEC169180C8}" srcId="{F5368A23-1B7D-4279-B3AD-4CA9F0518408}" destId="{57CA1591-04DE-4A1D-B4AD-FBA77ED7E8E3}" srcOrd="5" destOrd="0" parTransId="{74EC5F0B-0957-4943-9D77-68DF034A9BCB}" sibTransId="{87ADEB96-6158-4E2F-B5F0-F90B9A204ED8}"/>
+    <dgm:cxn modelId="{59CE59E0-6B50-423A-A87E-70B77C88E8C8}" type="presOf" srcId="{73ED6426-981F-4452-BA47-FA2607BF3EAB}" destId="{4D9E1D11-AD41-489F-94D8-1A599C269633}" srcOrd="0" destOrd="0" presId="urn:microsoft.com/office/officeart/2005/8/layout/hProcess9"/>
+    <dgm:cxn modelId="{AB4BF255-B17F-4917-9240-019B21C3C4DC}" srcId="{F5368A23-1B7D-4279-B3AD-4CA9F0518408}" destId="{FF9708DA-19FB-49CF-9958-31E5A5112DFD}" srcOrd="4" destOrd="0" parTransId="{384AA3CE-BF75-4FC6-BDE4-0C17092DDECD}" sibTransId="{F40B1C75-E705-4583-92EE-5034BE34C58B}"/>
     <dgm:cxn modelId="{AF60CE05-9CC1-47DE-84CF-CC2797527FCA}" type="presOf" srcId="{FF9708DA-19FB-49CF-9958-31E5A5112DFD}" destId="{CCFC8095-7082-4B06-947F-6D15A0DA16B0}" srcOrd="0" destOrd="0" presId="urn:microsoft.com/office/officeart/2005/8/layout/hProcess9"/>
-    <dgm:cxn modelId="{59CE59E0-6B50-423A-A87E-70B77C88E8C8}" type="presOf" srcId="{73ED6426-981F-4452-BA47-FA2607BF3EAB}" destId="{4D9E1D11-AD41-489F-94D8-1A599C269633}" srcOrd="0" destOrd="0" presId="urn:microsoft.com/office/officeart/2005/8/layout/hProcess9"/>
-    <dgm:cxn modelId="{E33A493C-9C59-457E-85BC-F0C8AF7ACCAC}" type="presOf" srcId="{1409A60F-C7F3-48FD-99B2-605FC7E3929D}" destId="{E8221166-9812-4A37-94A6-2AE242069AD1}" srcOrd="0" destOrd="0" presId="urn:microsoft.com/office/officeart/2005/8/layout/hProcess9"/>
-    <dgm:cxn modelId="{2BA0FAE6-28AE-4826-B8F9-0CEC169180C8}" srcId="{F5368A23-1B7D-4279-B3AD-4CA9F0518408}" destId="{57CA1591-04DE-4A1D-B4AD-FBA77ED7E8E3}" srcOrd="5" destOrd="0" parTransId="{74EC5F0B-0957-4943-9D77-68DF034A9BCB}" sibTransId="{87ADEB96-6158-4E2F-B5F0-F90B9A204ED8}"/>
-    <dgm:cxn modelId="{FF8D9B31-A43C-4C67-A69D-5583AB35FD1F}" srcId="{F5368A23-1B7D-4279-B3AD-4CA9F0518408}" destId="{F1841621-207C-4974-A8B4-D41CB0376707}" srcOrd="0" destOrd="0" parTransId="{26C85D8C-7646-40A1-B131-8AAF8C295C04}" sibTransId="{BDC1DEFC-337D-4B36-BEAA-F9DE10D6E42A}"/>
-    <dgm:cxn modelId="{CF4DFE49-F3ED-4599-A39F-ECEF3FDCB6B5}" type="presOf" srcId="{1D792BD0-576B-412C-AD22-07E4F9008D6E}" destId="{3EBFF596-174E-4DFC-AD7F-47B4B2FE0C74}" srcOrd="0" destOrd="0" presId="urn:microsoft.com/office/officeart/2005/8/layout/hProcess9"/>
-    <dgm:cxn modelId="{71E19963-128E-4801-BAFF-6B43CBA232C4}" type="presOf" srcId="{57CA1591-04DE-4A1D-B4AD-FBA77ED7E8E3}" destId="{65D6038A-7649-46D0-A50F-90198E9F8DB6}" srcOrd="0" destOrd="0" presId="urn:microsoft.com/office/officeart/2005/8/layout/hProcess9"/>
     <dgm:cxn modelId="{00673E61-EEDD-44D5-863A-83E058B85196}" srcId="{F5368A23-1B7D-4279-B3AD-4CA9F0518408}" destId="{73ED6426-981F-4452-BA47-FA2607BF3EAB}" srcOrd="3" destOrd="0" parTransId="{B6AC08E8-C5F0-4075-A35F-5C06A7049930}" sibTransId="{0053F94A-CD9E-4837-A099-675B66DE0FC4}"/>
     <dgm:cxn modelId="{C22622A6-EF84-49E5-BAF7-23B48BF7760F}" type="presParOf" srcId="{46B10996-CBC4-4ABD-A1AD-6DE48D552B90}" destId="{C0A653AB-AFB7-417F-903F-D1C04EBB5356}" srcOrd="0" destOrd="0" presId="urn:microsoft.com/office/officeart/2005/8/layout/hProcess9"/>
     <dgm:cxn modelId="{80335EC4-5153-4049-AED2-709EB0E7CD82}" type="presParOf" srcId="{46B10996-CBC4-4ABD-A1AD-6DE48D552B90}" destId="{C5443611-5F85-42B8-9354-031F3900F3CB}" srcOrd="1" destOrd="0" presId="urn:microsoft.com/office/officeart/2005/8/layout/hProcess9"/>
@@ -1596,12 +1647,12 @@
         </a:fontRef>
       </dsp:style>
       <dsp:txBody>
-        <a:bodyPr spcFirstLastPara="0" vert="horz" wrap="square" lIns="87630" tIns="87630" rIns="87630" bIns="87630" numCol="1" spcCol="1270" anchor="ctr" anchorCtr="0">
+        <a:bodyPr spcFirstLastPara="0" vert="horz" wrap="square" lIns="114300" tIns="114300" rIns="114300" bIns="114300" numCol="1" spcCol="1270" anchor="ctr" anchorCtr="0">
           <a:noAutofit/>
         </a:bodyPr>
         <a:lstStyle/>
         <a:p>
-          <a:pPr lvl="0" algn="ctr" defTabSz="1022350">
+          <a:pPr lvl="0" algn="ctr" defTabSz="1333500">
             <a:lnSpc>
               <a:spcPct val="90000"/>
             </a:lnSpc>
@@ -1613,10 +1664,10 @@
             </a:spcAft>
           </a:pPr>
           <a:r>
-            <a:rPr lang="de-DE" sz="2300" kern="1200" dirty="0" smtClean="0"/>
+            <a:rPr lang="de-DE" sz="3000" kern="1200" dirty="0" smtClean="0"/>
             <a:t>…</a:t>
           </a:r>
-          <a:endParaRPr lang="de-DE" sz="2300" kern="1200" dirty="0"/>
+          <a:endParaRPr lang="de-DE" sz="3000" kern="1200" dirty="0"/>
         </a:p>
       </dsp:txBody>
       <dsp:txXfrm>
@@ -1638,12 +1689,7 @@
           <a:avLst/>
         </a:prstGeom>
         <a:solidFill>
-          <a:schemeClr val="dk2">
-            <a:hueOff val="0"/>
-            <a:satOff val="0"/>
-            <a:lumOff val="0"/>
-            <a:alphaOff val="0"/>
-          </a:schemeClr>
+          <a:srgbClr val="1C8F0D"/>
         </a:solidFill>
         <a:ln w="38100" cap="rnd" cmpd="sng" algn="ctr">
           <a:solidFill>
@@ -1679,12 +1725,12 @@
         </a:fontRef>
       </dsp:style>
       <dsp:txBody>
-        <a:bodyPr spcFirstLastPara="0" vert="horz" wrap="square" lIns="87630" tIns="87630" rIns="87630" bIns="87630" numCol="1" spcCol="1270" anchor="ctr" anchorCtr="0">
+        <a:bodyPr spcFirstLastPara="0" vert="horz" wrap="square" lIns="114300" tIns="114300" rIns="114300" bIns="114300" numCol="1" spcCol="1270" anchor="ctr" anchorCtr="0">
           <a:noAutofit/>
         </a:bodyPr>
         <a:lstStyle/>
         <a:p>
-          <a:pPr lvl="0" algn="ctr" defTabSz="1022350">
+          <a:pPr lvl="0" algn="ctr" defTabSz="1333500">
             <a:lnSpc>
               <a:spcPct val="90000"/>
             </a:lnSpc>
@@ -1696,10 +1742,10 @@
             </a:spcAft>
           </a:pPr>
           <a:r>
-            <a:rPr lang="de-DE" sz="2300" kern="1200" dirty="0" smtClean="0"/>
-            <a:t>134</a:t>
+            <a:rPr lang="de-DE" sz="3000" kern="1200" dirty="0" smtClean="0"/>
+            <a:t>34</a:t>
           </a:r>
-          <a:endParaRPr lang="de-DE" sz="2300" kern="1200" dirty="0"/>
+          <a:endParaRPr lang="de-DE" sz="3000" kern="1200" dirty="0"/>
         </a:p>
       </dsp:txBody>
       <dsp:txXfrm>
@@ -1721,12 +1767,7 @@
           <a:avLst/>
         </a:prstGeom>
         <a:solidFill>
-          <a:schemeClr val="dk2">
-            <a:hueOff val="0"/>
-            <a:satOff val="0"/>
-            <a:lumOff val="0"/>
-            <a:alphaOff val="0"/>
-          </a:schemeClr>
+          <a:srgbClr val="1C8F0D"/>
         </a:solidFill>
         <a:ln w="38100" cap="rnd" cmpd="sng" algn="ctr">
           <a:solidFill>
@@ -1762,12 +1803,12 @@
         </a:fontRef>
       </dsp:style>
       <dsp:txBody>
-        <a:bodyPr spcFirstLastPara="0" vert="horz" wrap="square" lIns="87630" tIns="87630" rIns="87630" bIns="87630" numCol="1" spcCol="1270" anchor="ctr" anchorCtr="0">
+        <a:bodyPr spcFirstLastPara="0" vert="horz" wrap="square" lIns="114300" tIns="114300" rIns="114300" bIns="114300" numCol="1" spcCol="1270" anchor="ctr" anchorCtr="0">
           <a:noAutofit/>
         </a:bodyPr>
         <a:lstStyle/>
         <a:p>
-          <a:pPr lvl="0" algn="ctr" defTabSz="1022350">
+          <a:pPr lvl="0" algn="ctr" defTabSz="1333500">
             <a:lnSpc>
               <a:spcPct val="90000"/>
             </a:lnSpc>
@@ -1779,10 +1820,10 @@
             </a:spcAft>
           </a:pPr>
           <a:r>
-            <a:rPr lang="de-DE" sz="2300" kern="1200" dirty="0" smtClean="0"/>
-            <a:t>135</a:t>
+            <a:rPr lang="de-DE" sz="3000" kern="1200" dirty="0" smtClean="0"/>
+            <a:t>35</a:t>
           </a:r>
-          <a:endParaRPr lang="de-DE" sz="2300" kern="1200" dirty="0"/>
+          <a:endParaRPr lang="de-DE" sz="3000" kern="1200" dirty="0"/>
         </a:p>
       </dsp:txBody>
       <dsp:txXfrm>
@@ -1840,12 +1881,12 @@
         </a:fontRef>
       </dsp:style>
       <dsp:txBody>
-        <a:bodyPr spcFirstLastPara="0" vert="horz" wrap="square" lIns="87630" tIns="87630" rIns="87630" bIns="87630" numCol="1" spcCol="1270" anchor="ctr" anchorCtr="0">
+        <a:bodyPr spcFirstLastPara="0" vert="horz" wrap="square" lIns="114300" tIns="114300" rIns="114300" bIns="114300" numCol="1" spcCol="1270" anchor="ctr" anchorCtr="0">
           <a:noAutofit/>
         </a:bodyPr>
         <a:lstStyle/>
         <a:p>
-          <a:pPr lvl="0" algn="ctr" defTabSz="1022350">
+          <a:pPr lvl="0" algn="ctr" defTabSz="1333500">
             <a:lnSpc>
               <a:spcPct val="90000"/>
             </a:lnSpc>
@@ -1857,10 +1898,10 @@
             </a:spcAft>
           </a:pPr>
           <a:r>
-            <a:rPr lang="de-DE" sz="2300" kern="1200" dirty="0" smtClean="0"/>
+            <a:rPr lang="de-DE" sz="3000" kern="1200" dirty="0" smtClean="0"/>
             <a:t>?</a:t>
           </a:r>
-          <a:endParaRPr lang="de-DE" sz="2300" kern="1200" dirty="0"/>
+          <a:endParaRPr lang="de-DE" sz="3000" kern="1200" dirty="0"/>
         </a:p>
       </dsp:txBody>
       <dsp:txXfrm>
@@ -1918,12 +1959,12 @@
         </a:fontRef>
       </dsp:style>
       <dsp:txBody>
-        <a:bodyPr spcFirstLastPara="0" vert="horz" wrap="square" lIns="87630" tIns="87630" rIns="87630" bIns="87630" numCol="1" spcCol="1270" anchor="ctr" anchorCtr="0">
+        <a:bodyPr spcFirstLastPara="0" vert="horz" wrap="square" lIns="114300" tIns="114300" rIns="114300" bIns="114300" numCol="1" spcCol="1270" anchor="ctr" anchorCtr="0">
           <a:noAutofit/>
         </a:bodyPr>
         <a:lstStyle/>
         <a:p>
-          <a:pPr lvl="0" algn="ctr" defTabSz="1022350">
+          <a:pPr lvl="0" algn="ctr" defTabSz="1333500">
             <a:lnSpc>
               <a:spcPct val="90000"/>
             </a:lnSpc>
@@ -1935,10 +1976,10 @@
             </a:spcAft>
           </a:pPr>
           <a:r>
-            <a:rPr lang="de-DE" sz="2300" kern="1200" dirty="0" smtClean="0"/>
+            <a:rPr lang="de-DE" sz="3000" kern="1200" dirty="0" smtClean="0"/>
             <a:t>?</a:t>
           </a:r>
-          <a:endParaRPr lang="de-DE" sz="2300" kern="1200" dirty="0"/>
+          <a:endParaRPr lang="de-DE" sz="3000" kern="1200" dirty="0"/>
         </a:p>
       </dsp:txBody>
       <dsp:txXfrm>
@@ -1960,12 +2001,7 @@
           <a:avLst/>
         </a:prstGeom>
         <a:solidFill>
-          <a:schemeClr val="dk2">
-            <a:hueOff val="0"/>
-            <a:satOff val="0"/>
-            <a:lumOff val="0"/>
-            <a:alphaOff val="0"/>
-          </a:schemeClr>
+          <a:srgbClr val="1C8F0D"/>
         </a:solidFill>
         <a:ln w="38100" cap="rnd" cmpd="sng" algn="ctr">
           <a:solidFill>
@@ -2001,12 +2037,12 @@
         </a:fontRef>
       </dsp:style>
       <dsp:txBody>
-        <a:bodyPr spcFirstLastPara="0" vert="horz" wrap="square" lIns="87630" tIns="87630" rIns="87630" bIns="87630" numCol="1" spcCol="1270" anchor="ctr" anchorCtr="0">
+        <a:bodyPr spcFirstLastPara="0" vert="horz" wrap="square" lIns="114300" tIns="114300" rIns="114300" bIns="114300" numCol="1" spcCol="1270" anchor="ctr" anchorCtr="0">
           <a:noAutofit/>
         </a:bodyPr>
         <a:lstStyle/>
         <a:p>
-          <a:pPr lvl="0" algn="ctr" defTabSz="1022350">
+          <a:pPr lvl="0" algn="ctr" defTabSz="1333500">
             <a:lnSpc>
               <a:spcPct val="90000"/>
             </a:lnSpc>
@@ -2018,10 +2054,10 @@
             </a:spcAft>
           </a:pPr>
           <a:r>
-            <a:rPr lang="de-DE" sz="2300" kern="1200" dirty="0" smtClean="0"/>
-            <a:t>137</a:t>
+            <a:rPr lang="de-DE" sz="3000" kern="1200" dirty="0" smtClean="0"/>
+            <a:t>38</a:t>
           </a:r>
-          <a:endParaRPr lang="de-DE" sz="2300" kern="1200" dirty="0"/>
+          <a:endParaRPr lang="de-DE" sz="3000" kern="1200" dirty="0"/>
         </a:p>
       </dsp:txBody>
       <dsp:txXfrm>
@@ -2079,12 +2115,12 @@
         </a:fontRef>
       </dsp:style>
       <dsp:txBody>
-        <a:bodyPr spcFirstLastPara="0" vert="horz" wrap="square" lIns="87630" tIns="87630" rIns="87630" bIns="87630" numCol="1" spcCol="1270" anchor="ctr" anchorCtr="0">
+        <a:bodyPr spcFirstLastPara="0" vert="horz" wrap="square" lIns="114300" tIns="114300" rIns="114300" bIns="114300" numCol="1" spcCol="1270" anchor="ctr" anchorCtr="0">
           <a:noAutofit/>
         </a:bodyPr>
         <a:lstStyle/>
         <a:p>
-          <a:pPr lvl="0" algn="ctr" defTabSz="1022350">
+          <a:pPr lvl="0" algn="ctr" defTabSz="1333500">
             <a:lnSpc>
               <a:spcPct val="90000"/>
             </a:lnSpc>
@@ -2096,10 +2132,10 @@
             </a:spcAft>
           </a:pPr>
           <a:r>
-            <a:rPr lang="de-DE" sz="2300" kern="1200" dirty="0" smtClean="0"/>
+            <a:rPr lang="de-DE" sz="3000" kern="1200" dirty="0" smtClean="0"/>
             <a:t>?</a:t>
           </a:r>
-          <a:endParaRPr lang="de-DE" sz="2300" kern="1200" dirty="0"/>
+          <a:endParaRPr lang="de-DE" sz="3000" kern="1200" dirty="0"/>
         </a:p>
       </dsp:txBody>
       <dsp:txXfrm>
@@ -2121,12 +2157,7 @@
           <a:avLst/>
         </a:prstGeom>
         <a:solidFill>
-          <a:schemeClr val="dk2">
-            <a:hueOff val="0"/>
-            <a:satOff val="0"/>
-            <a:lumOff val="0"/>
-            <a:alphaOff val="0"/>
-          </a:schemeClr>
+          <a:srgbClr val="1C8F0D"/>
         </a:solidFill>
         <a:ln w="38100" cap="rnd" cmpd="sng" algn="ctr">
           <a:solidFill>
@@ -2162,12 +2193,12 @@
         </a:fontRef>
       </dsp:style>
       <dsp:txBody>
-        <a:bodyPr spcFirstLastPara="0" vert="horz" wrap="square" lIns="87630" tIns="87630" rIns="87630" bIns="87630" numCol="1" spcCol="1270" anchor="ctr" anchorCtr="0">
+        <a:bodyPr spcFirstLastPara="0" vert="horz" wrap="square" lIns="114300" tIns="114300" rIns="114300" bIns="114300" numCol="1" spcCol="1270" anchor="ctr" anchorCtr="0">
           <a:noAutofit/>
         </a:bodyPr>
         <a:lstStyle/>
         <a:p>
-          <a:pPr lvl="0" algn="ctr" defTabSz="1022350">
+          <a:pPr lvl="0" algn="ctr" defTabSz="1333500">
             <a:lnSpc>
               <a:spcPct val="90000"/>
             </a:lnSpc>
@@ -2179,10 +2210,10 @@
             </a:spcAft>
           </a:pPr>
           <a:r>
-            <a:rPr lang="de-DE" sz="2300" kern="1200" dirty="0" smtClean="0"/>
-            <a:t>139</a:t>
+            <a:rPr lang="de-DE" sz="3000" kern="1200" dirty="0" smtClean="0"/>
+            <a:t>40</a:t>
           </a:r>
-          <a:endParaRPr lang="de-DE" sz="2300" kern="1200" dirty="0"/>
+          <a:endParaRPr lang="de-DE" sz="3000" kern="1200" dirty="0"/>
         </a:p>
       </dsp:txBody>
       <dsp:txXfrm>
@@ -2243,12 +2274,12 @@
         </a:fontRef>
       </dsp:style>
       <dsp:txBody>
-        <a:bodyPr spcFirstLastPara="0" vert="horz" wrap="square" lIns="87630" tIns="87630" rIns="87630" bIns="87630" numCol="1" spcCol="1270" anchor="ctr" anchorCtr="0">
+        <a:bodyPr spcFirstLastPara="0" vert="horz" wrap="square" lIns="114300" tIns="114300" rIns="114300" bIns="114300" numCol="1" spcCol="1270" anchor="ctr" anchorCtr="0">
           <a:noAutofit/>
         </a:bodyPr>
         <a:lstStyle/>
         <a:p>
-          <a:pPr lvl="0" algn="ctr" defTabSz="1022350">
+          <a:pPr lvl="0" algn="ctr" defTabSz="1333500">
             <a:lnSpc>
               <a:spcPct val="90000"/>
             </a:lnSpc>
@@ -2260,10 +2291,10 @@
             </a:spcAft>
           </a:pPr>
           <a:r>
-            <a:rPr lang="de-DE" sz="2300" kern="1200" dirty="0" smtClean="0"/>
+            <a:rPr lang="de-DE" sz="3000" kern="1200" dirty="0" smtClean="0"/>
             <a:t>…</a:t>
           </a:r>
-          <a:endParaRPr lang="de-DE" sz="2300" kern="1200" dirty="0"/>
+          <a:endParaRPr lang="de-DE" sz="3000" kern="1200" dirty="0"/>
         </a:p>
       </dsp:txBody>
       <dsp:txXfrm>
@@ -6144,7 +6175,11 @@
           <a:p>
             <a:r>
               <a:rPr lang="de-DE" dirty="0" smtClean="0"/>
-              <a:t>Problems: Transmission Frame Loss</a:t>
+              <a:t>Problem: </a:t>
+            </a:r>
+            <a:r>
+              <a:rPr lang="de-DE" dirty="0" smtClean="0"/>
+              <a:t>Transmission Frame Loss</a:t>
             </a:r>
             <a:endParaRPr lang="en-US" dirty="0"/>
           </a:p>
@@ -6189,7 +6224,7 @@
             <p:ph sz="half" idx="1"/>
             <p:extLst>
               <p:ext uri="{D42A27DB-BD31-4B8C-83A1-F6EECF244321}">
-                <p14:modId xmlns:p14="http://schemas.microsoft.com/office/powerpoint/2010/main" val="221694314"/>
+                <p14:modId xmlns:p14="http://schemas.microsoft.com/office/powerpoint/2010/main" val="140793284"/>
               </p:ext>
             </p:extLst>
           </p:nvPr>
@@ -6839,7 +6874,7 @@
                 <a14:useLocalDpi xmlns:a14="http://schemas.microsoft.com/office/drawing/2010/main" val="0"/>
               </a:ext>
               <a:ext uri="{837473B0-CC2E-450A-ABE3-18F120FF3D39}">
-                <a1611:picAttrSrcUrl xmlns:a1611="http://schemas.microsoft.com/office/drawing/2016/11/main" xmlns="" r:id="rId3"/>
+                <a1611:picAttrSrcUrl xmlns="" xmlns:a1611="http://schemas.microsoft.com/office/drawing/2016/11/main" r:id="rId3"/>
               </a:ext>
             </a:extLst>
           </a:blip>

</xml_diff>